<commit_message>
finalized code with comments, simscape simulation
</commit_message>
<xml_diff>
--- a/flow_zoning/Flow zoning.pptx
+++ b/flow_zoning/Flow zoning.pptx
@@ -10,10 +10,9 @@
     <p:sldId id="258" r:id="rId4"/>
     <p:sldId id="259" r:id="rId5"/>
     <p:sldId id="263" r:id="rId6"/>
-    <p:sldId id="264" r:id="rId7"/>
-    <p:sldId id="260" r:id="rId8"/>
-    <p:sldId id="261" r:id="rId9"/>
-    <p:sldId id="262" r:id="rId10"/>
+    <p:sldId id="260" r:id="rId7"/>
+    <p:sldId id="261" r:id="rId8"/>
+    <p:sldId id="262" r:id="rId9"/>
   </p:sldIdLst>
   <p:sldSz cx="12192000" cy="6858000"/>
   <p:notesSz cx="6858000" cy="9144000"/>
@@ -3454,9 +3453,16 @@
             <p:ph type="title"/>
           </p:nvPr>
         </p:nvSpPr>
-        <p:spPr/>
-        <p:txBody>
-          <a:bodyPr/>
+        <p:spPr>
+          <a:xfrm>
+            <a:off x="838200" y="365126"/>
+            <a:ext cx="10515600" cy="694554"/>
+          </a:xfrm>
+        </p:spPr>
+        <p:txBody>
+          <a:bodyPr>
+            <a:normAutofit fontScale="90000"/>
+          </a:bodyPr>
           <a:lstStyle/>
           <a:p>
             <a:r>
@@ -3486,7 +3492,7 @@
             </p:nvSpPr>
             <p:spPr>
               <a:xfrm>
-                <a:off x="679579" y="1517715"/>
+                <a:off x="563742" y="1184429"/>
                 <a:ext cx="10515600" cy="4351338"/>
               </a:xfrm>
             </p:spPr>
@@ -3498,13 +3504,13 @@
               <a:p>
                 <a:r>
                   <a:rPr lang="en-US" sz="2000" dirty="0"/>
-                  <a:t>Flux </a:t>
+                  <a:t>Fission </a:t>
                 </a:r>
                 <a:r>
                   <a:rPr lang="en-US" sz="2000" dirty="0">
                     <a:sym typeface="Wingdings" panose="05000000000000000000" pitchFamily="2" charset="2"/>
                   </a:rPr>
-                  <a:t> proportional to generated fission power (F</a:t>
+                  <a:t>generated power (F</a:t>
                 </a:r>
                 <a14:m>
                   <m:oMath xmlns:m="http://schemas.openxmlformats.org/officeDocument/2006/math">
@@ -3556,7 +3562,7 @@
                   <a:rPr lang="en-US" sz="2000" dirty="0">
                     <a:sym typeface="Wingdings" panose="05000000000000000000" pitchFamily="2" charset="2"/>
                   </a:rPr>
-                  <a:t>)  flux tapers radially ( fast leakages)  non-homogeneous power profile.</a:t>
+                  <a:t>)  proportional to flux flux tapers radially ( fast leakages)  non-homogeneous power profile.</a:t>
                 </a:r>
               </a:p>
               <a:p>
@@ -3575,6 +3581,32 @@
                     <a:sym typeface="Wingdings" panose="05000000000000000000" pitchFamily="2" charset="2"/>
                   </a:rPr>
                   <a:t>Because of imposed boundary condition, flux will always drop off at the periphery of the reactor. </a:t>
+                </a:r>
+              </a:p>
+              <a:p>
+                <a:r>
+                  <a:rPr lang="en-US" sz="2200" dirty="0">
+                    <a:sym typeface="Wingdings" panose="05000000000000000000" pitchFamily="2" charset="2"/>
+                  </a:rPr>
+                  <a:t>In contrast with LWR: </a:t>
+                </a:r>
+              </a:p>
+              <a:p>
+                <a:pPr lvl="1"/>
+                <a:r>
+                  <a:rPr lang="en-US" sz="1800" dirty="0">
+                    <a:sym typeface="Wingdings" panose="05000000000000000000" pitchFamily="2" charset="2"/>
+                  </a:rPr>
+                  <a:t>Fast core is generally smaller  flux varies more</a:t>
+                </a:r>
+              </a:p>
+              <a:p>
+                <a:pPr lvl="1"/>
+                <a:r>
+                  <a:rPr lang="en-US" sz="1800" dirty="0">
+                    <a:sym typeface="Wingdings" panose="05000000000000000000" pitchFamily="2" charset="2"/>
+                  </a:rPr>
+                  <a:t>Sodium does not reflect neutrons as well as water </a:t>
                 </a:r>
               </a:p>
             </p:txBody>
@@ -3599,13 +3631,13 @@
             </p:nvSpPr>
             <p:spPr>
               <a:xfrm>
-                <a:off x="679579" y="1517715"/>
+                <a:off x="563742" y="1184429"/>
                 <a:ext cx="10515600" cy="4351338"/>
               </a:xfrm>
               <a:blipFill>
                 <a:blip r:embed="rId2"/>
                 <a:stretch>
-                  <a:fillRect l="-522" t="-1401"/>
+                  <a:fillRect l="-638" t="-1261"/>
                 </a:stretch>
               </a:blipFill>
             </p:spPr>
@@ -3652,8 +3684,8 @@
         </p:blipFill>
         <p:spPr>
           <a:xfrm>
-            <a:off x="563742" y="3294025"/>
-            <a:ext cx="7605203" cy="3537211"/>
+            <a:off x="6096000" y="2626168"/>
+            <a:ext cx="6255802" cy="2909599"/>
           </a:xfrm>
           <a:prstGeom prst="rect">
             <a:avLst/>
@@ -3674,7 +3706,7 @@
         </p:nvSpPr>
         <p:spPr>
           <a:xfrm>
-            <a:off x="7463308" y="4693298"/>
+            <a:off x="6992388" y="5351101"/>
             <a:ext cx="4596130" cy="369332"/>
           </a:xfrm>
           <a:prstGeom prst="rect">
@@ -3748,116 +3780,382 @@
           <a:p>
             <a:r>
               <a:rPr lang="en-US" dirty="0"/>
-              <a:t>Which phenomena is flow zoning mitigating</a:t>
-            </a:r>
-          </a:p>
-        </p:txBody>
-      </p:sp>
-      <p:sp>
-        <p:nvSpPr>
-          <p:cNvPr id="3" name="Θέση περιεχομένου 2">
-            <a:extLst>
-              <a:ext uri="{FF2B5EF4-FFF2-40B4-BE49-F238E27FC236}">
-                <a16:creationId xmlns:a16="http://schemas.microsoft.com/office/drawing/2014/main" id="{7F97BD42-FC28-3E6C-7A7F-25ECEF120342}"/>
-              </a:ext>
-            </a:extLst>
-          </p:cNvPr>
-          <p:cNvSpPr>
-            <a:spLocks noGrp="1"/>
-          </p:cNvSpPr>
-          <p:nvPr>
-            <p:ph idx="1"/>
-          </p:nvPr>
-        </p:nvSpPr>
-        <p:spPr/>
-        <p:txBody>
-          <a:bodyPr/>
-          <a:lstStyle/>
-          <a:p>
-            <a:pPr marL="514350" indent="-514350">
-              <a:buAutoNum type="arabicPeriod"/>
-            </a:pPr>
-            <a:r>
-              <a:rPr lang="en-US" dirty="0"/>
-              <a:t>Power varies </a:t>
-            </a:r>
-            <a:r>
-              <a:rPr lang="en-US" dirty="0">
-                <a:sym typeface="Wingdings" panose="05000000000000000000" pitchFamily="2" charset="2"/>
-              </a:rPr>
-              <a:t> q = </a:t>
-            </a:r>
-            <a:r>
-              <a:rPr lang="en-US" dirty="0" err="1">
-                <a:sym typeface="Wingdings" panose="05000000000000000000" pitchFamily="2" charset="2"/>
-              </a:rPr>
-              <a:t>mcpdt</a:t>
-            </a:r>
-            <a:r>
-              <a:rPr lang="en-US" dirty="0">
-                <a:sym typeface="Wingdings" panose="05000000000000000000" pitchFamily="2" charset="2"/>
-              </a:rPr>
-              <a:t>  for different power need different coolant flow </a:t>
-            </a:r>
-            <a:endParaRPr lang="en-US" dirty="0"/>
-          </a:p>
-          <a:p>
-            <a:pPr marL="514350" indent="-514350">
-              <a:buAutoNum type="arabicPeriod"/>
-            </a:pPr>
-            <a:r>
-              <a:rPr lang="en-US" dirty="0"/>
-              <a:t>Homogenize flow averaged temperature at outlet for all flow channels </a:t>
-            </a:r>
-            <a:r>
-              <a:rPr lang="en-US" dirty="0">
-                <a:sym typeface="Wingdings" panose="05000000000000000000" pitchFamily="2" charset="2"/>
-              </a:rPr>
-              <a:t> maximum outlet temperature</a:t>
-            </a:r>
-            <a:endParaRPr lang="en-US" dirty="0"/>
-          </a:p>
-          <a:p>
-            <a:pPr marL="514350" indent="-514350">
-              <a:buAutoNum type="arabicPeriod"/>
-            </a:pPr>
-            <a:r>
-              <a:rPr lang="en-US" dirty="0"/>
-              <a:t>Limit maximum temperatures that fuel, cladding exhibit (this is the most important </a:t>
-            </a:r>
-            <a:r>
-              <a:rPr lang="en-US" dirty="0" err="1"/>
-              <a:t>FoM</a:t>
-            </a:r>
-            <a:r>
-              <a:rPr lang="en-US" dirty="0"/>
-              <a:t>)</a:t>
-            </a:r>
-          </a:p>
-          <a:p>
-            <a:pPr marL="514350" indent="-514350">
-              <a:buAutoNum type="arabicPeriod"/>
-            </a:pPr>
-            <a:r>
-              <a:rPr lang="en-US" dirty="0"/>
-              <a:t>If the flow is close to critical parts that need to have a lower temperature (example: reactor vessel) </a:t>
-            </a:r>
-            <a:r>
-              <a:rPr lang="en-US" dirty="0">
-                <a:sym typeface="Wingdings" panose="05000000000000000000" pitchFamily="2" charset="2"/>
-              </a:rPr>
-              <a:t> increase flow to protect critical structural parts </a:t>
-            </a:r>
-            <a:endParaRPr lang="en-US" dirty="0"/>
-          </a:p>
-          <a:p>
-            <a:pPr marL="514350" indent="-514350">
-              <a:buAutoNum type="arabicPeriod"/>
-            </a:pPr>
-            <a:endParaRPr lang="en-US" dirty="0"/>
-          </a:p>
-        </p:txBody>
-      </p:sp>
+              <a:t>Which phenomena is flow-zoning mitigating:</a:t>
+            </a:r>
+          </a:p>
+        </p:txBody>
+      </p:sp>
+      <mc:AlternateContent xmlns:mc="http://schemas.openxmlformats.org/markup-compatibility/2006">
+        <mc:Choice xmlns:a14="http://schemas.microsoft.com/office/drawing/2010/main" Requires="a14">
+          <p:sp>
+            <p:nvSpPr>
+              <p:cNvPr id="3" name="Θέση περιεχομένου 2">
+                <a:extLst>
+                  <a:ext uri="{FF2B5EF4-FFF2-40B4-BE49-F238E27FC236}">
+                    <a16:creationId xmlns:a16="http://schemas.microsoft.com/office/drawing/2014/main" id="{7F97BD42-FC28-3E6C-7A7F-25ECEF120342}"/>
+                  </a:ext>
+                </a:extLst>
+              </p:cNvPr>
+              <p:cNvSpPr>
+                <a:spLocks noGrp="1"/>
+              </p:cNvSpPr>
+              <p:nvPr>
+                <p:ph idx="1"/>
+              </p:nvPr>
+            </p:nvSpPr>
+            <p:spPr>
+              <a:xfrm>
+                <a:off x="727104" y="1620526"/>
+                <a:ext cx="10515600" cy="4351338"/>
+              </a:xfrm>
+            </p:spPr>
+            <p:txBody>
+              <a:bodyPr>
+                <a:normAutofit/>
+              </a:bodyPr>
+              <a:lstStyle/>
+              <a:p>
+                <a:pPr marL="514350" indent="-514350">
+                  <a:buAutoNum type="arabicPeriod"/>
+                </a:pPr>
+                <a:r>
+                  <a:rPr lang="en-US" sz="2000" dirty="0"/>
+                  <a:t>Power that should be removed from fuel assemblies varies radially </a:t>
+                </a:r>
+                <a:r>
+                  <a:rPr lang="en-US" sz="2000" dirty="0">
+                    <a:sym typeface="Wingdings" panose="05000000000000000000" pitchFamily="2" charset="2"/>
+                  </a:rPr>
+                  <a:t> </a:t>
+                </a:r>
+                <a14:m>
+                  <m:oMath xmlns:m="http://schemas.openxmlformats.org/officeDocument/2006/math">
+                    <m:r>
+                      <a:rPr lang="en-US" sz="2000" i="1" dirty="0" smtClean="0">
+                        <a:latin typeface="Cambria Math" panose="02040503050406030204" pitchFamily="18" charset="0"/>
+                        <a:sym typeface="Wingdings" panose="05000000000000000000" pitchFamily="2" charset="2"/>
+                      </a:rPr>
+                      <m:t>𝑞</m:t>
+                    </m:r>
+                    <m:r>
+                      <a:rPr lang="en-US" sz="2000" i="1" dirty="0" smtClean="0">
+                        <a:latin typeface="Cambria Math" panose="02040503050406030204" pitchFamily="18" charset="0"/>
+                        <a:sym typeface="Wingdings" panose="05000000000000000000" pitchFamily="2" charset="2"/>
+                      </a:rPr>
+                      <m:t> = </m:t>
+                    </m:r>
+                    <m:acc>
+                      <m:accPr>
+                        <m:chr m:val="̇"/>
+                        <m:ctrlPr>
+                          <a:rPr lang="en-US" sz="2000" i="1" dirty="0" smtClean="0">
+                            <a:latin typeface="Cambria Math" panose="02040503050406030204" pitchFamily="18" charset="0"/>
+                            <a:sym typeface="Wingdings" panose="05000000000000000000" pitchFamily="2" charset="2"/>
+                          </a:rPr>
+                        </m:ctrlPr>
+                      </m:accPr>
+                      <m:e>
+                        <m:r>
+                          <a:rPr lang="en-US" sz="2000" b="0" i="1" dirty="0" smtClean="0">
+                            <a:latin typeface="Cambria Math" panose="02040503050406030204" pitchFamily="18" charset="0"/>
+                            <a:sym typeface="Wingdings" panose="05000000000000000000" pitchFamily="2" charset="2"/>
+                          </a:rPr>
+                          <m:t>𝑚</m:t>
+                        </m:r>
+                      </m:e>
+                    </m:acc>
+                    <m:sSub>
+                      <m:sSubPr>
+                        <m:ctrlPr>
+                          <a:rPr lang="en-US" sz="2000" b="0" i="1" dirty="0" smtClean="0">
+                            <a:latin typeface="Cambria Math" panose="02040503050406030204" pitchFamily="18" charset="0"/>
+                            <a:sym typeface="Wingdings" panose="05000000000000000000" pitchFamily="2" charset="2"/>
+                          </a:rPr>
+                        </m:ctrlPr>
+                      </m:sSubPr>
+                      <m:e>
+                        <m:r>
+                          <a:rPr lang="en-US" sz="2000" i="1" dirty="0" err="1">
+                            <a:latin typeface="Cambria Math" panose="02040503050406030204" pitchFamily="18" charset="0"/>
+                            <a:sym typeface="Wingdings" panose="05000000000000000000" pitchFamily="2" charset="2"/>
+                          </a:rPr>
+                          <m:t>𝑐</m:t>
+                        </m:r>
+                      </m:e>
+                      <m:sub>
+                        <m:r>
+                          <a:rPr lang="en-US" sz="2000" b="0" i="1" dirty="0" smtClean="0">
+                            <a:latin typeface="Cambria Math" panose="02040503050406030204" pitchFamily="18" charset="0"/>
+                            <a:sym typeface="Wingdings" panose="05000000000000000000" pitchFamily="2" charset="2"/>
+                          </a:rPr>
+                          <m:t>𝑝</m:t>
+                        </m:r>
+                      </m:sub>
+                    </m:sSub>
+                    <m:r>
+                      <a:rPr lang="en-US" sz="2000" b="0" i="1" dirty="0" smtClean="0">
+                        <a:latin typeface="Cambria Math" panose="02040503050406030204" pitchFamily="18" charset="0"/>
+                        <a:ea typeface="Cambria Math" panose="02040503050406030204" pitchFamily="18" charset="0"/>
+                        <a:sym typeface="Wingdings" panose="05000000000000000000" pitchFamily="2" charset="2"/>
+                      </a:rPr>
+                      <m:t>∆</m:t>
+                    </m:r>
+                    <m:r>
+                      <a:rPr lang="en-US" sz="2000" b="0" i="1" dirty="0" smtClean="0">
+                        <a:latin typeface="Cambria Math" panose="02040503050406030204" pitchFamily="18" charset="0"/>
+                        <a:ea typeface="Cambria Math" panose="02040503050406030204" pitchFamily="18" charset="0"/>
+                        <a:sym typeface="Wingdings" panose="05000000000000000000" pitchFamily="2" charset="2"/>
+                      </a:rPr>
+                      <m:t>𝑇</m:t>
+                    </m:r>
+                    <m:r>
+                      <a:rPr lang="en-US" sz="2000" i="1" dirty="0">
+                        <a:latin typeface="Cambria Math" panose="02040503050406030204" pitchFamily="18" charset="0"/>
+                        <a:sym typeface="Wingdings" panose="05000000000000000000" pitchFamily="2" charset="2"/>
+                      </a:rPr>
+                      <m:t> </m:t>
+                    </m:r>
+                  </m:oMath>
+                </a14:m>
+                <a:r>
+                  <a:rPr lang="en-US" sz="2000" dirty="0">
+                    <a:sym typeface="Wingdings" panose="05000000000000000000" pitchFamily="2" charset="2"/>
+                  </a:rPr>
+                  <a:t> </a:t>
+                </a:r>
+              </a:p>
+              <a:p>
+                <a:pPr marL="971550" lvl="1" indent="-514350">
+                  <a:buAutoNum type="arabicPeriod"/>
+                </a:pPr>
+                <a:r>
+                  <a:rPr lang="en-US" sz="1600" dirty="0">
+                    <a:sym typeface="Wingdings" panose="05000000000000000000" pitchFamily="2" charset="2"/>
+                  </a:rPr>
+                  <a:t>Different power generated per channel requires different flow rate to have the highest possible reactor outlet T while the fuel remaining below </a:t>
+                </a:r>
+                <a14:m>
+                  <m:oMath xmlns:m="http://schemas.openxmlformats.org/officeDocument/2006/math">
+                    <m:sSub>
+                      <m:sSubPr>
+                        <m:ctrlPr>
+                          <a:rPr lang="en-US" sz="1600" b="0" i="1" smtClean="0">
+                            <a:latin typeface="Cambria Math" panose="02040503050406030204" pitchFamily="18" charset="0"/>
+                            <a:sym typeface="Wingdings" panose="05000000000000000000" pitchFamily="2" charset="2"/>
+                          </a:rPr>
+                        </m:ctrlPr>
+                      </m:sSubPr>
+                      <m:e>
+                        <m:r>
+                          <a:rPr lang="en-US" sz="1600" b="0" i="1" smtClean="0">
+                            <a:latin typeface="Cambria Math" panose="02040503050406030204" pitchFamily="18" charset="0"/>
+                            <a:sym typeface="Wingdings" panose="05000000000000000000" pitchFamily="2" charset="2"/>
+                          </a:rPr>
+                          <m:t>𝑇</m:t>
+                        </m:r>
+                      </m:e>
+                      <m:sub>
+                        <m:r>
+                          <a:rPr lang="en-US" sz="1600" b="0" i="1" smtClean="0">
+                            <a:latin typeface="Cambria Math" panose="02040503050406030204" pitchFamily="18" charset="0"/>
+                            <a:sym typeface="Wingdings" panose="05000000000000000000" pitchFamily="2" charset="2"/>
+                          </a:rPr>
+                          <m:t>𝑓𝑢𝑒𝑙</m:t>
+                        </m:r>
+                        <m:r>
+                          <a:rPr lang="en-US" sz="1600" b="0" i="1" smtClean="0">
+                            <a:latin typeface="Cambria Math" panose="02040503050406030204" pitchFamily="18" charset="0"/>
+                            <a:sym typeface="Wingdings" panose="05000000000000000000" pitchFamily="2" charset="2"/>
+                          </a:rPr>
+                          <m:t>−</m:t>
+                        </m:r>
+                        <m:r>
+                          <a:rPr lang="en-US" sz="1600" b="0" i="1" smtClean="0">
+                            <a:latin typeface="Cambria Math" panose="02040503050406030204" pitchFamily="18" charset="0"/>
+                            <a:sym typeface="Wingdings" panose="05000000000000000000" pitchFamily="2" charset="2"/>
+                          </a:rPr>
+                          <m:t>𝑚𝑎𝑥</m:t>
+                        </m:r>
+                      </m:sub>
+                    </m:sSub>
+                  </m:oMath>
+                </a14:m>
+                <a:r>
+                  <a:rPr lang="en-US" sz="1600" dirty="0">
+                    <a:sym typeface="Wingdings" panose="05000000000000000000" pitchFamily="2" charset="2"/>
+                  </a:rPr>
+                  <a:t> </a:t>
+                </a:r>
+                <a:endParaRPr lang="en-US" sz="1600" dirty="0"/>
+              </a:p>
+              <a:p>
+                <a:pPr marL="514350" indent="-514350">
+                  <a:buAutoNum type="arabicPeriod"/>
+                </a:pPr>
+                <a:r>
+                  <a:rPr lang="en-US" sz="2000" dirty="0"/>
+                  <a:t>Core flow averaged temperature at outlet </a:t>
+                </a:r>
+                <a:r>
+                  <a:rPr lang="en-US" sz="2000" dirty="0">
+                    <a:sym typeface="Wingdings" panose="05000000000000000000" pitchFamily="2" charset="2"/>
+                  </a:rPr>
+                  <a:t> maximize</a:t>
+                </a:r>
+              </a:p>
+              <a:p>
+                <a:pPr marL="971550" lvl="1" indent="-514350">
+                  <a:buAutoNum type="arabicPeriod"/>
+                </a:pPr>
+                <a:r>
+                  <a:rPr lang="en-US" sz="1600" dirty="0">
+                    <a:sym typeface="Wingdings" panose="05000000000000000000" pitchFamily="2" charset="2"/>
+                  </a:rPr>
+                  <a:t> </a:t>
+                </a:r>
+                <a:r>
+                  <a:rPr lang="en-US" sz="1600" dirty="0" err="1">
+                    <a:sym typeface="Wingdings" panose="05000000000000000000" pitchFamily="2" charset="2"/>
+                  </a:rPr>
+                  <a:t>FoM</a:t>
+                </a:r>
+                <a:r>
+                  <a:rPr lang="en-US" sz="1600" dirty="0">
+                    <a:sym typeface="Wingdings" panose="05000000000000000000" pitchFamily="2" charset="2"/>
+                  </a:rPr>
+                  <a:t> for optimization</a:t>
+                </a:r>
+                <a:endParaRPr lang="en-US" sz="1600" dirty="0"/>
+              </a:p>
+              <a:p>
+                <a:pPr marL="514350" indent="-514350">
+                  <a:buAutoNum type="arabicPeriod"/>
+                </a:pPr>
+                <a:r>
+                  <a:rPr lang="en-US" sz="2000" dirty="0"/>
+                  <a:t>Limit maximum temperatures that fuel, cladding exhibit </a:t>
+                </a:r>
+              </a:p>
+              <a:p>
+                <a:pPr marL="971550" lvl="1" indent="-514350">
+                  <a:buAutoNum type="arabicPeriod"/>
+                </a:pPr>
+                <a:r>
+                  <a:rPr lang="en-US" sz="1600" dirty="0"/>
+                  <a:t>Constraint for optimization of flow zoning algorithm</a:t>
+                </a:r>
+              </a:p>
+              <a:p>
+                <a:pPr marL="514350" indent="-514350">
+                  <a:buAutoNum type="arabicPeriod"/>
+                </a:pPr>
+                <a:r>
+                  <a:rPr lang="en-US" sz="2000" dirty="0"/>
+                  <a:t>If the flow is close to critical parts that need to have a lower temperature:</a:t>
+                </a:r>
+              </a:p>
+              <a:p>
+                <a:pPr marL="971550" lvl="1" indent="-514350">
+                  <a:buAutoNum type="arabicPeriod"/>
+                </a:pPr>
+                <a:r>
+                  <a:rPr lang="en-US" sz="1600" dirty="0"/>
+                  <a:t>example: reactor vessel </a:t>
+                </a:r>
+                <a:r>
+                  <a:rPr lang="en-US" sz="1600" dirty="0">
+                    <a:sym typeface="Wingdings" panose="05000000000000000000" pitchFamily="2" charset="2"/>
+                  </a:rPr>
+                  <a:t> increase flow to protect critical structural parts </a:t>
+                </a:r>
+              </a:p>
+              <a:p>
+                <a:pPr marL="514350" indent="-514350">
+                  <a:buAutoNum type="arabicPeriod"/>
+                </a:pPr>
+                <a:r>
+                  <a:rPr lang="en-US" sz="2000" dirty="0">
+                    <a:sym typeface="Wingdings" panose="05000000000000000000" pitchFamily="2" charset="2"/>
+                  </a:rPr>
+                  <a:t>Divert flow to other parts of the reactor </a:t>
+                </a:r>
+              </a:p>
+              <a:p>
+                <a:pPr marL="514350" indent="-514350">
+                  <a:buAutoNum type="arabicPeriod"/>
+                </a:pPr>
+                <a:r>
+                  <a:rPr lang="en-US" sz="2000" dirty="0">
+                    <a:sym typeface="Wingdings" panose="05000000000000000000" pitchFamily="2" charset="2"/>
+                  </a:rPr>
+                  <a:t>Reduce structural stresses on fuel grid plate:</a:t>
+                </a:r>
+              </a:p>
+              <a:p>
+                <a:pPr marL="971550" lvl="1" indent="-514350">
+                  <a:buAutoNum type="arabicPeriod"/>
+                </a:pPr>
+                <a:r>
+                  <a:rPr lang="en-US" sz="1600" dirty="0">
+                    <a:sym typeface="Wingdings" panose="05000000000000000000" pitchFamily="2" charset="2"/>
+                  </a:rPr>
+                  <a:t>Differential pressure from lower and upper plenum creates stresses on the reactor structure. Flow zoning could be used to lower these stresses</a:t>
+                </a:r>
+                <a:endParaRPr lang="en-US" sz="1600" dirty="0"/>
+              </a:p>
+              <a:p>
+                <a:pPr marL="514350" indent="-514350">
+                  <a:buAutoNum type="arabicPeriod"/>
+                </a:pPr>
+                <a:endParaRPr lang="en-US" sz="2000" dirty="0"/>
+              </a:p>
+            </p:txBody>
+          </p:sp>
+        </mc:Choice>
+        <mc:Fallback>
+          <p:sp>
+            <p:nvSpPr>
+              <p:cNvPr id="3" name="Θέση περιεχομένου 2">
+                <a:extLst>
+                  <a:ext uri="{FF2B5EF4-FFF2-40B4-BE49-F238E27FC236}">
+                    <a16:creationId xmlns:a16="http://schemas.microsoft.com/office/drawing/2014/main" id="{7F97BD42-FC28-3E6C-7A7F-25ECEF120342}"/>
+                  </a:ext>
+                </a:extLst>
+              </p:cNvPr>
+              <p:cNvSpPr>
+                <a:spLocks noGrp="1" noRot="1" noChangeAspect="1" noMove="1" noResize="1" noEditPoints="1" noAdjustHandles="1" noChangeArrowheads="1" noChangeShapeType="1" noTextEdit="1"/>
+              </p:cNvSpPr>
+              <p:nvPr>
+                <p:ph idx="1"/>
+              </p:nvPr>
+            </p:nvSpPr>
+            <p:spPr>
+              <a:xfrm>
+                <a:off x="727104" y="1620526"/>
+                <a:ext cx="10515600" cy="4351338"/>
+              </a:xfrm>
+              <a:blipFill>
+                <a:blip r:embed="rId2"/>
+                <a:stretch>
+                  <a:fillRect l="-464" t="-1401"/>
+                </a:stretch>
+              </a:blipFill>
+            </p:spPr>
+            <p:txBody>
+              <a:bodyPr/>
+              <a:lstStyle/>
+              <a:p>
+                <a:r>
+                  <a:rPr lang="en-US">
+                    <a:noFill/>
+                  </a:rPr>
+                  <a:t> </a:t>
+                </a:r>
+              </a:p>
+            </p:txBody>
+          </p:sp>
+        </mc:Fallback>
+      </mc:AlternateContent>
     </p:spTree>
     <p:extLst>
       <p:ext uri="{BB962C8B-B14F-4D97-AF65-F5344CB8AC3E}">
@@ -3932,31 +4230,34 @@
             <p:ph idx="1"/>
           </p:nvPr>
         </p:nvSpPr>
-        <p:spPr/>
-        <p:txBody>
-          <a:bodyPr/>
+        <p:spPr>
+          <a:xfrm>
+            <a:off x="735650" y="1483793"/>
+            <a:ext cx="10515600" cy="4351338"/>
+          </a:xfrm>
+        </p:spPr>
+        <p:txBody>
+          <a:bodyPr>
+            <a:normAutofit fontScale="77500" lnSpcReduction="20000"/>
+          </a:bodyPr>
           <a:lstStyle/>
           <a:p>
             <a:pPr marL="514350" indent="-514350">
               <a:buAutoNum type="arabicPeriod"/>
             </a:pPr>
             <a:r>
-              <a:rPr lang="en-US" dirty="0"/>
-              <a:t>Power </a:t>
-            </a:r>
-            <a:r>
-              <a:rPr lang="en-US"/>
-              <a:t>generation per channel </a:t>
-            </a:r>
-            <a:endParaRPr lang="en-US" dirty="0"/>
+              <a:rPr lang="en-US" sz="2000" dirty="0"/>
+              <a:t>Power generation per channel </a:t>
+            </a:r>
+            <a:endParaRPr lang="en-US" sz="1600" dirty="0"/>
           </a:p>
           <a:p>
             <a:pPr marL="514350" indent="-514350">
               <a:buAutoNum type="arabicPeriod"/>
             </a:pPr>
             <a:r>
-              <a:rPr lang="en-US" dirty="0"/>
-              <a:t>How this changes with BU/ time </a:t>
+              <a:rPr lang="en-US" sz="2000" dirty="0"/>
+              <a:t>How power generation changes with BU/ time </a:t>
             </a:r>
           </a:p>
           <a:p>
@@ -3964,11 +4265,43 @@
               <a:buAutoNum type="arabicPeriod"/>
             </a:pPr>
             <a:r>
-              <a:rPr lang="en-US" dirty="0"/>
+              <a:rPr lang="en-US" sz="2000" dirty="0"/>
+              <a:t>What if power distribution remains the same but total power reduces? With the installed orifices would the flow distribution also remain the same without changing the orifices?</a:t>
+            </a:r>
+          </a:p>
+          <a:p>
+            <a:pPr marL="971550" lvl="1" indent="-514350">
+              <a:buAutoNum type="arabicPeriod"/>
+            </a:pPr>
+            <a:r>
+              <a:rPr lang="en-US" sz="1600"/>
+              <a:t>It depends!</a:t>
+            </a:r>
+            <a:endParaRPr lang="en-US" sz="1600" dirty="0"/>
+          </a:p>
+          <a:p>
+            <a:pPr marL="514350" indent="-514350">
+              <a:buFont typeface="Arial" panose="020B0604020202020204" pitchFamily="34" charset="0"/>
+              <a:buAutoNum type="arabicPeriod"/>
+            </a:pPr>
+            <a:r>
+              <a:rPr lang="en-US" sz="2000" dirty="0">
+                <a:sym typeface="Wingdings" panose="05000000000000000000" pitchFamily="2" charset="2"/>
+              </a:rPr>
+              <a:t>If the power generation changes above the flow-zone “power levels”  variable orifice should be installed </a:t>
+            </a:r>
+            <a:endParaRPr lang="en-US" sz="2000" dirty="0"/>
+          </a:p>
+          <a:p>
+            <a:pPr marL="514350" indent="-514350">
+              <a:buAutoNum type="arabicPeriod"/>
+            </a:pPr>
+            <a:r>
+              <a:rPr lang="en-US" sz="2000" dirty="0"/>
               <a:t>What is flow velocity at orifices </a:t>
             </a:r>
             <a:r>
-              <a:rPr lang="en-US" dirty="0">
+              <a:rPr lang="en-US" sz="2000" dirty="0">
                 <a:sym typeface="Wingdings" panose="05000000000000000000" pitchFamily="2" charset="2"/>
               </a:rPr>
               <a:t> cavitation? Thermal striping?</a:t>
@@ -3979,12 +4312,117 @@
               <a:buAutoNum type="arabicPeriod"/>
             </a:pPr>
             <a:r>
-              <a:rPr lang="en-US" dirty="0">
+              <a:rPr lang="en-US" sz="2000" dirty="0">
                 <a:sym typeface="Wingdings" panose="05000000000000000000" pitchFamily="2" charset="2"/>
               </a:rPr>
-              <a:t>If the power generation changes above the orifice “power levels”  variable orifice should be installed </a:t>
-            </a:r>
-            <a:endParaRPr lang="en-US" dirty="0"/>
+              <a:t>Pressure drop at channels might not be the same (different channel hydraulic diameter)</a:t>
+            </a:r>
+          </a:p>
+          <a:p>
+            <a:pPr marL="514350" indent="-514350">
+              <a:buAutoNum type="arabicPeriod"/>
+            </a:pPr>
+            <a:r>
+              <a:rPr lang="en-US" sz="2000" dirty="0">
+                <a:sym typeface="Wingdings" panose="05000000000000000000" pitchFamily="2" charset="2"/>
+              </a:rPr>
+              <a:t>Flow regime: </a:t>
+            </a:r>
+          </a:p>
+          <a:p>
+            <a:pPr marL="971550" lvl="1" indent="-514350">
+              <a:buAutoNum type="arabicPeriod"/>
+            </a:pPr>
+            <a:r>
+              <a:rPr lang="en-US" sz="1600" dirty="0">
+                <a:sym typeface="Wingdings" panose="05000000000000000000" pitchFamily="2" charset="2"/>
+              </a:rPr>
+              <a:t>If laminar hydraulic resistance does not depend on flow velocity</a:t>
+            </a:r>
+          </a:p>
+          <a:p>
+            <a:pPr marL="971550" lvl="1" indent="-514350">
+              <a:buAutoNum type="arabicPeriod"/>
+            </a:pPr>
+            <a:r>
+              <a:rPr lang="en-US" sz="1600" dirty="0">
+                <a:sym typeface="Wingdings" panose="05000000000000000000" pitchFamily="2" charset="2"/>
+              </a:rPr>
+              <a:t>If turbulent however resistance does depend on flow velocity  tend to spread evenly the flow, compensate with higher </a:t>
+            </a:r>
+            <a:r>
+              <a:rPr lang="en-US" sz="1600" dirty="0" err="1">
+                <a:sym typeface="Wingdings" panose="05000000000000000000" pitchFamily="2" charset="2"/>
+              </a:rPr>
+              <a:t>orrifie</a:t>
+            </a:r>
+            <a:r>
+              <a:rPr lang="en-US" sz="1600" dirty="0">
+                <a:sym typeface="Wingdings" panose="05000000000000000000" pitchFamily="2" charset="2"/>
+              </a:rPr>
+              <a:t> resistance. </a:t>
+            </a:r>
+          </a:p>
+          <a:p>
+            <a:pPr marL="514350" indent="-514350">
+              <a:buAutoNum type="arabicPeriod"/>
+            </a:pPr>
+            <a:r>
+              <a:rPr lang="en-US" sz="2000" dirty="0">
+                <a:sym typeface="Wingdings" panose="05000000000000000000" pitchFamily="2" charset="2"/>
+              </a:rPr>
+              <a:t>Ease of installation of orifices, cost</a:t>
+            </a:r>
+          </a:p>
+          <a:p>
+            <a:pPr marL="514350" indent="-514350">
+              <a:buAutoNum type="arabicPeriod"/>
+            </a:pPr>
+            <a:r>
+              <a:rPr lang="en-US" sz="2000" dirty="0">
+                <a:sym typeface="Wingdings" panose="05000000000000000000" pitchFamily="2" charset="2"/>
+              </a:rPr>
+              <a:t>Orifice design should be modular: should be able to be stacked on top of each other to create the desired pressure drop</a:t>
+            </a:r>
+          </a:p>
+          <a:p>
+            <a:pPr marL="514350" indent="-514350">
+              <a:buAutoNum type="arabicPeriod"/>
+            </a:pPr>
+            <a:r>
+              <a:rPr lang="en-US" sz="2000" dirty="0">
+                <a:sym typeface="Wingdings" panose="05000000000000000000" pitchFamily="2" charset="2"/>
+              </a:rPr>
+              <a:t>How the flow enters the lower plenum: </a:t>
+            </a:r>
+          </a:p>
+          <a:p>
+            <a:pPr marL="971550" lvl="1" indent="-514350">
+              <a:buAutoNum type="arabicPeriod"/>
+            </a:pPr>
+            <a:r>
+              <a:rPr lang="en-US" sz="1600" dirty="0">
+                <a:sym typeface="Wingdings" panose="05000000000000000000" pitchFamily="2" charset="2"/>
+              </a:rPr>
+              <a:t>Downcomer?</a:t>
+            </a:r>
+          </a:p>
+          <a:p>
+            <a:pPr marL="971550" lvl="1" indent="-514350">
+              <a:buAutoNum type="arabicPeriod"/>
+            </a:pPr>
+            <a:r>
+              <a:rPr lang="en-US" sz="1600" dirty="0">
+                <a:sym typeface="Wingdings" panose="05000000000000000000" pitchFamily="2" charset="2"/>
+              </a:rPr>
+              <a:t>Mixing plate?</a:t>
+            </a:r>
+          </a:p>
+          <a:p>
+            <a:pPr marL="514350" indent="-514350">
+              <a:buAutoNum type="arabicPeriod"/>
+            </a:pPr>
+            <a:endParaRPr lang="en-US" sz="2000" dirty="0"/>
           </a:p>
         </p:txBody>
       </p:sp>
@@ -4034,47 +4472,59 @@
             <p:ph type="title"/>
           </p:nvPr>
         </p:nvSpPr>
-        <p:spPr/>
-        <p:txBody>
-          <a:bodyPr/>
-          <a:lstStyle/>
-          <a:p>
-            <a:r>
-              <a:rPr lang="en-US" dirty="0"/>
-              <a:t>How is flow zoning done:</a:t>
-            </a:r>
-          </a:p>
-        </p:txBody>
-      </p:sp>
-      <p:sp>
-        <p:nvSpPr>
-          <p:cNvPr id="3" name="Θέση περιεχομένου 2">
-            <a:extLst>
-              <a:ext uri="{FF2B5EF4-FFF2-40B4-BE49-F238E27FC236}">
-                <a16:creationId xmlns:a16="http://schemas.microsoft.com/office/drawing/2014/main" id="{7147F0CD-4F5A-184B-2A63-CE5CB2564FB7}"/>
-              </a:ext>
-            </a:extLst>
-          </p:cNvPr>
-          <p:cNvSpPr>
-            <a:spLocks noGrp="1"/>
-          </p:cNvSpPr>
-          <p:nvPr>
-            <p:ph idx="1"/>
-          </p:nvPr>
-        </p:nvSpPr>
-        <p:spPr/>
+        <p:spPr>
+          <a:xfrm>
+            <a:off x="667284" y="-15136"/>
+            <a:ext cx="10515600" cy="1325563"/>
+          </a:xfrm>
+        </p:spPr>
         <p:txBody>
           <a:bodyPr>
             <a:normAutofit/>
           </a:bodyPr>
           <a:lstStyle/>
           <a:p>
+            <a:r>
+              <a:rPr lang="en-US" sz="4000" dirty="0"/>
+              <a:t>How is flow zoning done:</a:t>
+            </a:r>
+          </a:p>
+        </p:txBody>
+      </p:sp>
+      <p:sp>
+        <p:nvSpPr>
+          <p:cNvPr id="3" name="Θέση περιεχομένου 2">
+            <a:extLst>
+              <a:ext uri="{FF2B5EF4-FFF2-40B4-BE49-F238E27FC236}">
+                <a16:creationId xmlns:a16="http://schemas.microsoft.com/office/drawing/2014/main" id="{7147F0CD-4F5A-184B-2A63-CE5CB2564FB7}"/>
+              </a:ext>
+            </a:extLst>
+          </p:cNvPr>
+          <p:cNvSpPr>
+            <a:spLocks noGrp="1"/>
+          </p:cNvSpPr>
+          <p:nvPr>
+            <p:ph idx="1"/>
+          </p:nvPr>
+        </p:nvSpPr>
+        <p:spPr>
+          <a:xfrm>
+            <a:off x="838200" y="1167598"/>
+            <a:ext cx="10515600" cy="1968709"/>
+          </a:xfrm>
+        </p:spPr>
+        <p:txBody>
+          <a:bodyPr>
+            <a:normAutofit/>
+          </a:bodyPr>
+          <a:lstStyle/>
+          <a:p>
             <a:pPr marL="457200" indent="-457200">
               <a:buAutoNum type="arabicPeriod"/>
             </a:pPr>
             <a:r>
               <a:rPr lang="en-US" sz="2000" dirty="0"/>
-              <a:t>goal: vary outlet T radially</a:t>
+              <a:t>Goal: vary outlet T radially</a:t>
             </a:r>
           </a:p>
           <a:p>
@@ -4100,7 +4550,7 @@
               <a:rPr lang="en-US" sz="2000" dirty="0">
                 <a:sym typeface="Wingdings" panose="05000000000000000000" pitchFamily="2" charset="2"/>
               </a:rPr>
-              <a:t>Only solution is to add extra hydraulic resistance to the zones that should have lesser flow</a:t>
+              <a:t>Only solution is to add extra hydraulic resistance to the zones that should have a smaller flow</a:t>
             </a:r>
           </a:p>
           <a:p>
@@ -4115,11 +4565,11 @@
             </a:r>
           </a:p>
           <a:p>
-            <a:pPr marL="457200" indent="-457200">
+            <a:pPr marL="914400" lvl="1" indent="-457200">
               <a:buAutoNum type="arabicPeriod"/>
             </a:pPr>
             <a:r>
-              <a:rPr lang="en-US" sz="2000" dirty="0">
+              <a:rPr lang="en-US" sz="1600" dirty="0">
                 <a:sym typeface="Wingdings" panose="05000000000000000000" pitchFamily="2" charset="2"/>
               </a:rPr>
               <a:t>This resistance can either be constant throughout the lifetime of the reactor, or change as a function of BU.</a:t>
@@ -4142,6 +4592,300 @@
           <a:p>
             <a:pPr marL="0" indent="0">
               <a:buNone/>
+            </a:pPr>
+            <a:endParaRPr lang="en-US" sz="2000" dirty="0"/>
+          </a:p>
+        </p:txBody>
+      </p:sp>
+      <p:sp>
+        <p:nvSpPr>
+          <p:cNvPr id="4" name="Τίτλος 1">
+            <a:extLst>
+              <a:ext uri="{FF2B5EF4-FFF2-40B4-BE49-F238E27FC236}">
+                <a16:creationId xmlns:a16="http://schemas.microsoft.com/office/drawing/2014/main" id="{2CDC248C-4415-07F0-709A-3C3535D7551D}"/>
+              </a:ext>
+            </a:extLst>
+          </p:cNvPr>
+          <p:cNvSpPr txBox="1">
+            <a:spLocks/>
+          </p:cNvSpPr>
+          <p:nvPr/>
+        </p:nvSpPr>
+        <p:spPr>
+          <a:xfrm>
+            <a:off x="752742" y="2928863"/>
+            <a:ext cx="10515600" cy="1325563"/>
+          </a:xfrm>
+          <a:prstGeom prst="rect">
+            <a:avLst/>
+          </a:prstGeom>
+        </p:spPr>
+        <p:txBody>
+          <a:bodyPr vert="horz" lIns="91440" tIns="45720" rIns="91440" bIns="45720" rtlCol="0" anchor="ctr">
+            <a:normAutofit/>
+          </a:bodyPr>
+          <a:lstStyle>
+            <a:lvl1pPr algn="l" defTabSz="914400" rtl="0" eaLnBrk="1" latinLnBrk="0" hangingPunct="1">
+              <a:lnSpc>
+                <a:spcPct val="90000"/>
+              </a:lnSpc>
+              <a:spcBef>
+                <a:spcPct val="0"/>
+              </a:spcBef>
+              <a:buNone/>
+              <a:defRPr sz="4400" kern="1200">
+                <a:solidFill>
+                  <a:schemeClr val="tx1"/>
+                </a:solidFill>
+                <a:latin typeface="+mj-lt"/>
+                <a:ea typeface="+mj-ea"/>
+                <a:cs typeface="+mj-cs"/>
+              </a:defRPr>
+            </a:lvl1pPr>
+          </a:lstStyle>
+          <a:p>
+            <a:r>
+              <a:rPr lang="en-US" sz="4000" dirty="0"/>
+              <a:t>What if core is shuffled:</a:t>
+            </a:r>
+          </a:p>
+        </p:txBody>
+      </p:sp>
+      <p:sp>
+        <p:nvSpPr>
+          <p:cNvPr id="5" name="Θέση περιεχομένου 2">
+            <a:extLst>
+              <a:ext uri="{FF2B5EF4-FFF2-40B4-BE49-F238E27FC236}">
+                <a16:creationId xmlns:a16="http://schemas.microsoft.com/office/drawing/2014/main" id="{C8D4F39C-B898-4002-B52B-3638E46FD25A}"/>
+              </a:ext>
+            </a:extLst>
+          </p:cNvPr>
+          <p:cNvSpPr txBox="1">
+            <a:spLocks/>
+          </p:cNvSpPr>
+          <p:nvPr/>
+        </p:nvSpPr>
+        <p:spPr>
+          <a:xfrm>
+            <a:off x="667284" y="4081927"/>
+            <a:ext cx="10515600" cy="1840246"/>
+          </a:xfrm>
+          <a:prstGeom prst="rect">
+            <a:avLst/>
+          </a:prstGeom>
+        </p:spPr>
+        <p:txBody>
+          <a:bodyPr vert="horz" lIns="91440" tIns="45720" rIns="91440" bIns="45720" rtlCol="0">
+            <a:normAutofit/>
+          </a:bodyPr>
+          <a:lstStyle>
+            <a:lvl1pPr marL="228600" indent="-228600" algn="l" defTabSz="914400" rtl="0" eaLnBrk="1" latinLnBrk="0" hangingPunct="1">
+              <a:lnSpc>
+                <a:spcPct val="90000"/>
+              </a:lnSpc>
+              <a:spcBef>
+                <a:spcPts val="1000"/>
+              </a:spcBef>
+              <a:buFont typeface="Arial" panose="020B0604020202020204" pitchFamily="34" charset="0"/>
+              <a:buChar char="•"/>
+              <a:defRPr sz="2800" kern="1200">
+                <a:solidFill>
+                  <a:schemeClr val="tx1"/>
+                </a:solidFill>
+                <a:latin typeface="+mn-lt"/>
+                <a:ea typeface="+mn-ea"/>
+                <a:cs typeface="+mn-cs"/>
+              </a:defRPr>
+            </a:lvl1pPr>
+            <a:lvl2pPr marL="685800" indent="-228600" algn="l" defTabSz="914400" rtl="0" eaLnBrk="1" latinLnBrk="0" hangingPunct="1">
+              <a:lnSpc>
+                <a:spcPct val="90000"/>
+              </a:lnSpc>
+              <a:spcBef>
+                <a:spcPts val="500"/>
+              </a:spcBef>
+              <a:buFont typeface="Arial" panose="020B0604020202020204" pitchFamily="34" charset="0"/>
+              <a:buChar char="•"/>
+              <a:defRPr sz="2400" kern="1200">
+                <a:solidFill>
+                  <a:schemeClr val="tx1"/>
+                </a:solidFill>
+                <a:latin typeface="+mn-lt"/>
+                <a:ea typeface="+mn-ea"/>
+                <a:cs typeface="+mn-cs"/>
+              </a:defRPr>
+            </a:lvl2pPr>
+            <a:lvl3pPr marL="1143000" indent="-228600" algn="l" defTabSz="914400" rtl="0" eaLnBrk="1" latinLnBrk="0" hangingPunct="1">
+              <a:lnSpc>
+                <a:spcPct val="90000"/>
+              </a:lnSpc>
+              <a:spcBef>
+                <a:spcPts val="500"/>
+              </a:spcBef>
+              <a:buFont typeface="Arial" panose="020B0604020202020204" pitchFamily="34" charset="0"/>
+              <a:buChar char="•"/>
+              <a:defRPr sz="2000" kern="1200">
+                <a:solidFill>
+                  <a:schemeClr val="tx1"/>
+                </a:solidFill>
+                <a:latin typeface="+mn-lt"/>
+                <a:ea typeface="+mn-ea"/>
+                <a:cs typeface="+mn-cs"/>
+              </a:defRPr>
+            </a:lvl3pPr>
+            <a:lvl4pPr marL="1600200" indent="-228600" algn="l" defTabSz="914400" rtl="0" eaLnBrk="1" latinLnBrk="0" hangingPunct="1">
+              <a:lnSpc>
+                <a:spcPct val="90000"/>
+              </a:lnSpc>
+              <a:spcBef>
+                <a:spcPts val="500"/>
+              </a:spcBef>
+              <a:buFont typeface="Arial" panose="020B0604020202020204" pitchFamily="34" charset="0"/>
+              <a:buChar char="•"/>
+              <a:defRPr sz="1800" kern="1200">
+                <a:solidFill>
+                  <a:schemeClr val="tx1"/>
+                </a:solidFill>
+                <a:latin typeface="+mn-lt"/>
+                <a:ea typeface="+mn-ea"/>
+                <a:cs typeface="+mn-cs"/>
+              </a:defRPr>
+            </a:lvl4pPr>
+            <a:lvl5pPr marL="2057400" indent="-228600" algn="l" defTabSz="914400" rtl="0" eaLnBrk="1" latinLnBrk="0" hangingPunct="1">
+              <a:lnSpc>
+                <a:spcPct val="90000"/>
+              </a:lnSpc>
+              <a:spcBef>
+                <a:spcPts val="500"/>
+              </a:spcBef>
+              <a:buFont typeface="Arial" panose="020B0604020202020204" pitchFamily="34" charset="0"/>
+              <a:buChar char="•"/>
+              <a:defRPr sz="1800" kern="1200">
+                <a:solidFill>
+                  <a:schemeClr val="tx1"/>
+                </a:solidFill>
+                <a:latin typeface="+mn-lt"/>
+                <a:ea typeface="+mn-ea"/>
+                <a:cs typeface="+mn-cs"/>
+              </a:defRPr>
+            </a:lvl5pPr>
+            <a:lvl6pPr marL="2514600" indent="-228600" algn="l" defTabSz="914400" rtl="0" eaLnBrk="1" latinLnBrk="0" hangingPunct="1">
+              <a:lnSpc>
+                <a:spcPct val="90000"/>
+              </a:lnSpc>
+              <a:spcBef>
+                <a:spcPts val="500"/>
+              </a:spcBef>
+              <a:buFont typeface="Arial" panose="020B0604020202020204" pitchFamily="34" charset="0"/>
+              <a:buChar char="•"/>
+              <a:defRPr sz="1800" kern="1200">
+                <a:solidFill>
+                  <a:schemeClr val="tx1"/>
+                </a:solidFill>
+                <a:latin typeface="+mn-lt"/>
+                <a:ea typeface="+mn-ea"/>
+                <a:cs typeface="+mn-cs"/>
+              </a:defRPr>
+            </a:lvl6pPr>
+            <a:lvl7pPr marL="2971800" indent="-228600" algn="l" defTabSz="914400" rtl="0" eaLnBrk="1" latinLnBrk="0" hangingPunct="1">
+              <a:lnSpc>
+                <a:spcPct val="90000"/>
+              </a:lnSpc>
+              <a:spcBef>
+                <a:spcPts val="500"/>
+              </a:spcBef>
+              <a:buFont typeface="Arial" panose="020B0604020202020204" pitchFamily="34" charset="0"/>
+              <a:buChar char="•"/>
+              <a:defRPr sz="1800" kern="1200">
+                <a:solidFill>
+                  <a:schemeClr val="tx1"/>
+                </a:solidFill>
+                <a:latin typeface="+mn-lt"/>
+                <a:ea typeface="+mn-ea"/>
+                <a:cs typeface="+mn-cs"/>
+              </a:defRPr>
+            </a:lvl7pPr>
+            <a:lvl8pPr marL="3429000" indent="-228600" algn="l" defTabSz="914400" rtl="0" eaLnBrk="1" latinLnBrk="0" hangingPunct="1">
+              <a:lnSpc>
+                <a:spcPct val="90000"/>
+              </a:lnSpc>
+              <a:spcBef>
+                <a:spcPts val="500"/>
+              </a:spcBef>
+              <a:buFont typeface="Arial" panose="020B0604020202020204" pitchFamily="34" charset="0"/>
+              <a:buChar char="•"/>
+              <a:defRPr sz="1800" kern="1200">
+                <a:solidFill>
+                  <a:schemeClr val="tx1"/>
+                </a:solidFill>
+                <a:latin typeface="+mn-lt"/>
+                <a:ea typeface="+mn-ea"/>
+                <a:cs typeface="+mn-cs"/>
+              </a:defRPr>
+            </a:lvl8pPr>
+            <a:lvl9pPr marL="3886200" indent="-228600" algn="l" defTabSz="914400" rtl="0" eaLnBrk="1" latinLnBrk="0" hangingPunct="1">
+              <a:lnSpc>
+                <a:spcPct val="90000"/>
+              </a:lnSpc>
+              <a:spcBef>
+                <a:spcPts val="500"/>
+              </a:spcBef>
+              <a:buFont typeface="Arial" panose="020B0604020202020204" pitchFamily="34" charset="0"/>
+              <a:buChar char="•"/>
+              <a:defRPr sz="1800" kern="1200">
+                <a:solidFill>
+                  <a:schemeClr val="tx1"/>
+                </a:solidFill>
+                <a:latin typeface="+mn-lt"/>
+                <a:ea typeface="+mn-ea"/>
+                <a:cs typeface="+mn-cs"/>
+              </a:defRPr>
+            </a:lvl9pPr>
+          </a:lstStyle>
+          <a:p>
+            <a:pPr marL="514350" indent="-514350">
+              <a:buFont typeface="+mj-lt"/>
+              <a:buAutoNum type="arabicPeriod"/>
+            </a:pPr>
+            <a:r>
+              <a:rPr lang="en-US" sz="2000" dirty="0"/>
+              <a:t>If core is shuffled </a:t>
+            </a:r>
+            <a:r>
+              <a:rPr lang="en-US" sz="2000" dirty="0">
+                <a:sym typeface="Wingdings" panose="05000000000000000000" pitchFamily="2" charset="2"/>
+              </a:rPr>
+              <a:t> radial power distribution changes </a:t>
+            </a:r>
+          </a:p>
+          <a:p>
+            <a:pPr marL="514350" indent="-514350">
+              <a:buFont typeface="+mj-lt"/>
+              <a:buAutoNum type="arabicPeriod"/>
+            </a:pPr>
+            <a:r>
+              <a:rPr lang="en-US" sz="2000" dirty="0">
+                <a:sym typeface="Wingdings" panose="05000000000000000000" pitchFamily="2" charset="2"/>
+              </a:rPr>
+              <a:t>Either implement flow zoning algorithm described below to optimize for outlet T for core’s lifetime, with constant orifice resistance</a:t>
+            </a:r>
+          </a:p>
+          <a:p>
+            <a:pPr marL="971550" lvl="1" indent="-514350">
+              <a:buFont typeface="+mj-lt"/>
+              <a:buAutoNum type="arabicPeriod"/>
+            </a:pPr>
+            <a:r>
+              <a:rPr lang="en-US" sz="1600" dirty="0">
+                <a:sym typeface="Wingdings" panose="05000000000000000000" pitchFamily="2" charset="2"/>
+              </a:rPr>
+              <a:t>Or use variable orifices</a:t>
+            </a:r>
+          </a:p>
+          <a:p>
+            <a:pPr marL="514350" indent="-514350">
+              <a:buFont typeface="+mj-lt"/>
+              <a:buAutoNum type="arabicPeriod"/>
             </a:pPr>
             <a:endParaRPr lang="en-US" sz="2000" dirty="0"/>
           </a:p>
@@ -4182,7 +4926,7 @@
           <p:cNvPr id="2" name="Τίτλος 1">
             <a:extLst>
               <a:ext uri="{FF2B5EF4-FFF2-40B4-BE49-F238E27FC236}">
-                <a16:creationId xmlns:a16="http://schemas.microsoft.com/office/drawing/2014/main" id="{EFFA59D9-6854-BA2A-D6BB-B1D1B3D2B37B}"/>
+                <a16:creationId xmlns:a16="http://schemas.microsoft.com/office/drawing/2014/main" id="{7D72F9B9-9779-1BBC-6A49-E76061A8DEC4}"/>
               </a:ext>
             </a:extLst>
           </p:cNvPr>
@@ -4193,93 +4937,387 @@
             <p:ph type="title"/>
           </p:nvPr>
         </p:nvSpPr>
-        <p:spPr/>
-        <p:txBody>
-          <a:bodyPr/>
-          <a:lstStyle/>
-          <a:p>
-            <a:r>
-              <a:rPr lang="en-US" dirty="0"/>
-              <a:t>What if core is shuffled:</a:t>
-            </a:r>
-          </a:p>
-        </p:txBody>
-      </p:sp>
-      <p:sp>
-        <p:nvSpPr>
-          <p:cNvPr id="3" name="Θέση περιεχομένου 2">
-            <a:extLst>
-              <a:ext uri="{FF2B5EF4-FFF2-40B4-BE49-F238E27FC236}">
-                <a16:creationId xmlns:a16="http://schemas.microsoft.com/office/drawing/2014/main" id="{77EDD5FC-CA60-4F07-E825-023996402AA8}"/>
-              </a:ext>
-            </a:extLst>
-          </p:cNvPr>
-          <p:cNvSpPr>
-            <a:spLocks noGrp="1"/>
-          </p:cNvSpPr>
-          <p:nvPr>
-            <p:ph idx="1"/>
-          </p:nvPr>
-        </p:nvSpPr>
-        <p:spPr/>
+        <p:spPr>
+          <a:xfrm>
+            <a:off x="950073" y="168024"/>
+            <a:ext cx="11484528" cy="605028"/>
+          </a:xfrm>
+        </p:spPr>
         <p:txBody>
           <a:bodyPr>
             <a:normAutofit/>
           </a:bodyPr>
           <a:lstStyle/>
           <a:p>
-            <a:pPr marL="514350" indent="-514350">
+            <a:r>
+              <a:rPr lang="en-US" sz="3600" dirty="0"/>
+              <a:t>Flow zoning algorithm to maximize outlet temp:</a:t>
+            </a:r>
+          </a:p>
+        </p:txBody>
+      </p:sp>
+      <p:sp>
+        <p:nvSpPr>
+          <p:cNvPr id="3" name="Θέση περιεχομένου 2">
+            <a:extLst>
+              <a:ext uri="{FF2B5EF4-FFF2-40B4-BE49-F238E27FC236}">
+                <a16:creationId xmlns:a16="http://schemas.microsoft.com/office/drawing/2014/main" id="{4F8B165A-6B2F-D72F-BA0A-E53769697874}"/>
+              </a:ext>
+            </a:extLst>
+          </p:cNvPr>
+          <p:cNvSpPr>
+            <a:spLocks noGrp="1"/>
+          </p:cNvSpPr>
+          <p:nvPr>
+            <p:ph idx="1"/>
+          </p:nvPr>
+        </p:nvSpPr>
+        <p:spPr>
+          <a:xfrm>
+            <a:off x="573280" y="1555365"/>
+            <a:ext cx="10515600" cy="2068082"/>
+          </a:xfrm>
+        </p:spPr>
+        <p:txBody>
+          <a:bodyPr>
+            <a:normAutofit/>
+          </a:bodyPr>
+          <a:lstStyle/>
+          <a:p>
+            <a:pPr marL="457200" indent="-457200">
               <a:buFont typeface="+mj-lt"/>
               <a:buAutoNum type="arabicPeriod"/>
             </a:pPr>
             <a:r>
               <a:rPr lang="en-US" sz="2000" dirty="0"/>
-              <a:t>If core is shuffled </a:t>
+              <a:t>Discrete optimization problem </a:t>
             </a:r>
             <a:r>
               <a:rPr lang="en-US" sz="2000" dirty="0">
                 <a:sym typeface="Wingdings" panose="05000000000000000000" pitchFamily="2" charset="2"/>
               </a:rPr>
-              <a:t> radial power distribution changes </a:t>
-            </a:r>
-          </a:p>
-          <a:p>
-            <a:pPr marL="514350" indent="-514350">
+              <a:t> harder to solve. It could be approximated by using the equivalent “Continuous problem”</a:t>
+            </a:r>
+          </a:p>
+          <a:p>
+            <a:pPr marL="457200" indent="-457200">
               <a:buFont typeface="+mj-lt"/>
               <a:buAutoNum type="arabicPeriod"/>
             </a:pPr>
             <a:r>
-              <a:rPr lang="en-US" sz="2000" dirty="0">
-                <a:sym typeface="Wingdings" panose="05000000000000000000" pitchFamily="2" charset="2"/>
-              </a:rPr>
-              <a:t>Either implement flow zoning algorithm described below to optimize for outlet T for core’s lifetime, with constant orifice resistance</a:t>
-            </a:r>
-          </a:p>
-          <a:p>
-            <a:pPr marL="971550" lvl="1" indent="-514350">
-              <a:buFont typeface="+mj-lt"/>
+              <a:rPr lang="en-US" sz="2000" dirty="0"/>
+              <a:t>Take power values and create histogram: </a:t>
+            </a:r>
+          </a:p>
+          <a:p>
+            <a:pPr marL="457200" indent="-457200">
               <a:buAutoNum type="arabicPeriod"/>
             </a:pPr>
             <a:r>
-              <a:rPr lang="en-US" sz="1600" dirty="0">
-                <a:sym typeface="Wingdings" panose="05000000000000000000" pitchFamily="2" charset="2"/>
-              </a:rPr>
-              <a:t>Or use variable orifices</a:t>
-            </a:r>
-          </a:p>
-          <a:p>
-            <a:pPr marL="514350" indent="-514350">
-              <a:buFont typeface="+mj-lt"/>
+              <a:rPr lang="en-US" sz="2000" dirty="0"/>
+              <a:t>From discrete distribution function, can analytically approximate its shape:</a:t>
+            </a:r>
+          </a:p>
+          <a:p>
+            <a:pPr marL="914400" lvl="1" indent="-457200">
               <a:buAutoNum type="arabicPeriod"/>
             </a:pPr>
-            <a:endParaRPr lang="en-US" sz="2000" dirty="0"/>
+            <a:r>
+              <a:rPr lang="en-US" sz="1600" dirty="0"/>
+              <a:t>Now we have an analytical description of the distribution function of the radial power density.</a:t>
+            </a:r>
+          </a:p>
+        </p:txBody>
+      </p:sp>
+      <p:pic>
+        <p:nvPicPr>
+          <p:cNvPr id="5" name="Εικόνα 4" descr="Εικόνα που περιέχει κείμενο, στιγμιότυπο οθόνης, γραμμή, γράφημα&#10;&#10;Περιγραφή που δημιουργήθηκε αυτόματα">
+            <a:extLst>
+              <a:ext uri="{FF2B5EF4-FFF2-40B4-BE49-F238E27FC236}">
+                <a16:creationId xmlns:a16="http://schemas.microsoft.com/office/drawing/2014/main" id="{9E96F26A-CA8A-AC04-7E97-0824770A2DCD}"/>
+              </a:ext>
+            </a:extLst>
+          </p:cNvPr>
+          <p:cNvPicPr>
+            <a:picLocks noChangeAspect="1"/>
+          </p:cNvPicPr>
+          <p:nvPr/>
+        </p:nvPicPr>
+        <p:blipFill>
+          <a:blip r:embed="rId2">
+            <a:extLst>
+              <a:ext uri="{28A0092B-C50C-407E-A947-70E740481C1C}">
+                <a14:useLocalDpi xmlns:a14="http://schemas.microsoft.com/office/drawing/2010/main" val="0"/>
+              </a:ext>
+            </a:extLst>
+          </a:blip>
+          <a:stretch>
+            <a:fillRect/>
+          </a:stretch>
+        </p:blipFill>
+        <p:spPr>
+          <a:xfrm>
+            <a:off x="271968" y="3530236"/>
+            <a:ext cx="4330484" cy="3247863"/>
+          </a:xfrm>
+          <a:prstGeom prst="rect">
+            <a:avLst/>
+          </a:prstGeom>
+        </p:spPr>
+      </p:pic>
+      <p:sp>
+        <p:nvSpPr>
+          <p:cNvPr id="6" name="Βέλος: Δεξιό 5">
+            <a:extLst>
+              <a:ext uri="{FF2B5EF4-FFF2-40B4-BE49-F238E27FC236}">
+                <a16:creationId xmlns:a16="http://schemas.microsoft.com/office/drawing/2014/main" id="{2221613E-7362-DDC6-F6F5-90C4992B6A2D}"/>
+              </a:ext>
+            </a:extLst>
+          </p:cNvPr>
+          <p:cNvSpPr/>
+          <p:nvPr/>
+        </p:nvSpPr>
+        <p:spPr>
+          <a:xfrm>
+            <a:off x="5019499" y="4877330"/>
+            <a:ext cx="1107347" cy="276836"/>
+          </a:xfrm>
+          <a:prstGeom prst="rightArrow">
+            <a:avLst/>
+          </a:prstGeom>
+        </p:spPr>
+        <p:style>
+          <a:lnRef idx="2">
+            <a:schemeClr val="accent1">
+              <a:shade val="15000"/>
+            </a:schemeClr>
+          </a:lnRef>
+          <a:fillRef idx="1">
+            <a:schemeClr val="accent1"/>
+          </a:fillRef>
+          <a:effectRef idx="0">
+            <a:schemeClr val="accent1"/>
+          </a:effectRef>
+          <a:fontRef idx="minor">
+            <a:schemeClr val="lt1"/>
+          </a:fontRef>
+        </p:style>
+        <p:txBody>
+          <a:bodyPr rtlCol="0" anchor="ctr"/>
+          <a:lstStyle/>
+          <a:p>
+            <a:pPr algn="ctr"/>
+            <a:endParaRPr lang="en-US"/>
+          </a:p>
+        </p:txBody>
+      </p:sp>
+      <p:pic>
+        <p:nvPicPr>
+          <p:cNvPr id="10" name="Εικόνα 9">
+            <a:extLst>
+              <a:ext uri="{FF2B5EF4-FFF2-40B4-BE49-F238E27FC236}">
+                <a16:creationId xmlns:a16="http://schemas.microsoft.com/office/drawing/2014/main" id="{577B24E5-DCAF-E86A-3E9B-972C44C74DAC}"/>
+              </a:ext>
+            </a:extLst>
+          </p:cNvPr>
+          <p:cNvPicPr>
+            <a:picLocks noChangeAspect="1"/>
+          </p:cNvPicPr>
+          <p:nvPr/>
+        </p:nvPicPr>
+        <p:blipFill>
+          <a:blip r:embed="rId3"/>
+          <a:stretch>
+            <a:fillRect/>
+          </a:stretch>
+        </p:blipFill>
+        <p:spPr>
+          <a:xfrm>
+            <a:off x="7493215" y="3690665"/>
+            <a:ext cx="3847663" cy="2927003"/>
+          </a:xfrm>
+          <a:prstGeom prst="rect">
+            <a:avLst/>
+          </a:prstGeom>
+        </p:spPr>
+      </p:pic>
+      <p:sp>
+        <p:nvSpPr>
+          <p:cNvPr id="11" name="TextBox 10">
+            <a:extLst>
+              <a:ext uri="{FF2B5EF4-FFF2-40B4-BE49-F238E27FC236}">
+                <a16:creationId xmlns:a16="http://schemas.microsoft.com/office/drawing/2014/main" id="{4C6C46B4-6530-4440-1ECF-84787AD3B33C}"/>
+              </a:ext>
+            </a:extLst>
+          </p:cNvPr>
+          <p:cNvSpPr txBox="1"/>
+          <p:nvPr/>
+        </p:nvSpPr>
+        <p:spPr>
+          <a:xfrm>
+            <a:off x="663694" y="873243"/>
+            <a:ext cx="10690106" cy="369332"/>
+          </a:xfrm>
+          <a:prstGeom prst="rect">
+            <a:avLst/>
+          </a:prstGeom>
+          <a:noFill/>
+        </p:spPr>
+        <p:txBody>
+          <a:bodyPr wrap="none" rtlCol="0">
+            <a:spAutoFit/>
+          </a:bodyPr>
+          <a:lstStyle/>
+          <a:p>
+            <a:r>
+              <a:rPr lang="en-US" dirty="0"/>
+              <a:t>Problem statement: </a:t>
+            </a:r>
+            <a:r>
+              <a:rPr lang="en-US" dirty="0">
+                <a:highlight>
+                  <a:srgbClr val="00FF00"/>
+                </a:highlight>
+              </a:rPr>
+              <a:t>position of cuts is what</a:t>
+            </a:r>
+            <a:r>
+              <a:rPr lang="en-US" dirty="0"/>
+              <a:t>? </a:t>
+            </a:r>
+            <a:r>
+              <a:rPr lang="en-US" dirty="0">
+                <a:highlight>
+                  <a:srgbClr val="00FFFF"/>
+                </a:highlight>
+              </a:rPr>
+              <a:t>So that core averaged outlet T is maximized </a:t>
+            </a:r>
+            <a:r>
+              <a:rPr lang="en-US" dirty="0"/>
+              <a:t>while </a:t>
+            </a:r>
+            <a:r>
+              <a:rPr lang="en-US" dirty="0">
+                <a:highlight>
+                  <a:srgbClr val="FF00FF"/>
+                </a:highlight>
+              </a:rPr>
+              <a:t>fuel T below limits</a:t>
+            </a:r>
+          </a:p>
+        </p:txBody>
+      </p:sp>
+      <p:sp>
+        <p:nvSpPr>
+          <p:cNvPr id="12" name="TextBox 11">
+            <a:extLst>
+              <a:ext uri="{FF2B5EF4-FFF2-40B4-BE49-F238E27FC236}">
+                <a16:creationId xmlns:a16="http://schemas.microsoft.com/office/drawing/2014/main" id="{D32C6945-BF17-E480-4DA3-02E83B38149D}"/>
+              </a:ext>
+            </a:extLst>
+          </p:cNvPr>
+          <p:cNvSpPr txBox="1"/>
+          <p:nvPr/>
+        </p:nvSpPr>
+        <p:spPr>
+          <a:xfrm>
+            <a:off x="9804692" y="1152424"/>
+            <a:ext cx="1300294" cy="369332"/>
+          </a:xfrm>
+          <a:prstGeom prst="rect">
+            <a:avLst/>
+          </a:prstGeom>
+          <a:noFill/>
+        </p:spPr>
+        <p:txBody>
+          <a:bodyPr wrap="square" rtlCol="0">
+            <a:spAutoFit/>
+          </a:bodyPr>
+          <a:lstStyle/>
+          <a:p>
+            <a:r>
+              <a:rPr lang="en-US" b="1" dirty="0"/>
+              <a:t>constraints</a:t>
+            </a:r>
+          </a:p>
+        </p:txBody>
+      </p:sp>
+      <p:sp>
+        <p:nvSpPr>
+          <p:cNvPr id="13" name="TextBox 12">
+            <a:extLst>
+              <a:ext uri="{FF2B5EF4-FFF2-40B4-BE49-F238E27FC236}">
+                <a16:creationId xmlns:a16="http://schemas.microsoft.com/office/drawing/2014/main" id="{E3175FD6-820B-9DF9-968C-E01336BC1F94}"/>
+              </a:ext>
+            </a:extLst>
+          </p:cNvPr>
+          <p:cNvSpPr txBox="1"/>
+          <p:nvPr/>
+        </p:nvSpPr>
+        <p:spPr>
+          <a:xfrm>
+            <a:off x="2437210" y="1118815"/>
+            <a:ext cx="2716967" cy="369332"/>
+          </a:xfrm>
+          <a:prstGeom prst="rect">
+            <a:avLst/>
+          </a:prstGeom>
+          <a:noFill/>
+        </p:spPr>
+        <p:txBody>
+          <a:bodyPr wrap="square" rtlCol="0">
+            <a:spAutoFit/>
+          </a:bodyPr>
+          <a:lstStyle/>
+          <a:p>
+            <a:r>
+              <a:rPr lang="en-US" b="1" dirty="0"/>
+              <a:t>Optimization parameters</a:t>
+            </a:r>
+          </a:p>
+        </p:txBody>
+      </p:sp>
+      <p:sp>
+        <p:nvSpPr>
+          <p:cNvPr id="14" name="TextBox 13">
+            <a:extLst>
+              <a:ext uri="{FF2B5EF4-FFF2-40B4-BE49-F238E27FC236}">
+                <a16:creationId xmlns:a16="http://schemas.microsoft.com/office/drawing/2014/main" id="{80D06D70-CF31-DC4E-AD52-A4F913A6B6D2}"/>
+              </a:ext>
+            </a:extLst>
+          </p:cNvPr>
+          <p:cNvSpPr txBox="1"/>
+          <p:nvPr/>
+        </p:nvSpPr>
+        <p:spPr>
+          <a:xfrm>
+            <a:off x="6486683" y="1125127"/>
+            <a:ext cx="1345478" cy="369332"/>
+          </a:xfrm>
+          <a:prstGeom prst="rect">
+            <a:avLst/>
+          </a:prstGeom>
+          <a:noFill/>
+        </p:spPr>
+        <p:txBody>
+          <a:bodyPr wrap="square" rtlCol="0">
+            <a:spAutoFit/>
+          </a:bodyPr>
+          <a:lstStyle/>
+          <a:p>
+            <a:r>
+              <a:rPr lang="en-US" b="1" dirty="0" err="1"/>
+              <a:t>FoM</a:t>
+            </a:r>
+            <a:endParaRPr lang="en-US" b="1" dirty="0"/>
           </a:p>
         </p:txBody>
       </p:sp>
     </p:spTree>
     <p:extLst>
       <p:ext uri="{BB962C8B-B14F-4D97-AF65-F5344CB8AC3E}">
-        <p14:creationId xmlns:p14="http://schemas.microsoft.com/office/powerpoint/2010/main" val="3641793445"/>
+        <p14:creationId xmlns:p14="http://schemas.microsoft.com/office/powerpoint/2010/main" val="2505318595"/>
       </p:ext>
     </p:extLst>
   </p:cSld>
@@ -4311,429 +5349,6 @@
           <p:cNvPr id="2" name="Τίτλος 1">
             <a:extLst>
               <a:ext uri="{FF2B5EF4-FFF2-40B4-BE49-F238E27FC236}">
-                <a16:creationId xmlns:a16="http://schemas.microsoft.com/office/drawing/2014/main" id="{7D72F9B9-9779-1BBC-6A49-E76061A8DEC4}"/>
-              </a:ext>
-            </a:extLst>
-          </p:cNvPr>
-          <p:cNvSpPr>
-            <a:spLocks noGrp="1"/>
-          </p:cNvSpPr>
-          <p:nvPr>
-            <p:ph type="title"/>
-          </p:nvPr>
-        </p:nvSpPr>
-        <p:spPr>
-          <a:xfrm>
-            <a:off x="377505" y="365126"/>
-            <a:ext cx="11484528" cy="834044"/>
-          </a:xfrm>
-        </p:spPr>
-        <p:txBody>
-          <a:bodyPr>
-            <a:normAutofit/>
-          </a:bodyPr>
-          <a:lstStyle/>
-          <a:p>
-            <a:r>
-              <a:rPr lang="en-US" sz="3600" dirty="0"/>
-              <a:t>Flow zoning algorithm to maximize outlet temp:</a:t>
-            </a:r>
-          </a:p>
-        </p:txBody>
-      </p:sp>
-      <p:sp>
-        <p:nvSpPr>
-          <p:cNvPr id="3" name="Θέση περιεχομένου 2">
-            <a:extLst>
-              <a:ext uri="{FF2B5EF4-FFF2-40B4-BE49-F238E27FC236}">
-                <a16:creationId xmlns:a16="http://schemas.microsoft.com/office/drawing/2014/main" id="{4F8B165A-6B2F-D72F-BA0A-E53769697874}"/>
-              </a:ext>
-            </a:extLst>
-          </p:cNvPr>
-          <p:cNvSpPr>
-            <a:spLocks noGrp="1"/>
-          </p:cNvSpPr>
-          <p:nvPr>
-            <p:ph idx="1"/>
-          </p:nvPr>
-        </p:nvSpPr>
-        <p:spPr>
-          <a:xfrm>
-            <a:off x="838200" y="1242575"/>
-            <a:ext cx="10515600" cy="4351338"/>
-          </a:xfrm>
-        </p:spPr>
-        <p:txBody>
-          <a:bodyPr>
-            <a:normAutofit/>
-          </a:bodyPr>
-          <a:lstStyle/>
-          <a:p>
-            <a:pPr marL="457200" indent="-457200">
-              <a:buFont typeface="+mj-lt"/>
-              <a:buAutoNum type="arabicPeriod"/>
-            </a:pPr>
-            <a:r>
-              <a:rPr lang="en-US" sz="2000" dirty="0"/>
-              <a:t>Discrete optimization problem </a:t>
-            </a:r>
-            <a:r>
-              <a:rPr lang="en-US" sz="2000" dirty="0">
-                <a:sym typeface="Wingdings" panose="05000000000000000000" pitchFamily="2" charset="2"/>
-              </a:rPr>
-              <a:t> harder to solve. It could be approximated by using the equivalent “Continuous problem”</a:t>
-            </a:r>
-          </a:p>
-          <a:p>
-            <a:pPr marL="457200" indent="-457200">
-              <a:buFont typeface="+mj-lt"/>
-              <a:buAutoNum type="arabicPeriod"/>
-            </a:pPr>
-            <a:r>
-              <a:rPr lang="en-US" sz="2000" dirty="0"/>
-              <a:t>Take power values and create histogram: </a:t>
-            </a:r>
-          </a:p>
-          <a:p>
-            <a:pPr marL="457200" indent="-457200">
-              <a:buAutoNum type="arabicPeriod"/>
-            </a:pPr>
-            <a:r>
-              <a:rPr lang="en-US" sz="2000" dirty="0"/>
-              <a:t>From discrete distribution function, can analytically approximate its shape:</a:t>
-            </a:r>
-          </a:p>
-          <a:p>
-            <a:pPr marL="914400" lvl="1" indent="-457200">
-              <a:buAutoNum type="arabicPeriod"/>
-            </a:pPr>
-            <a:r>
-              <a:rPr lang="en-US" sz="1600" dirty="0"/>
-              <a:t>Now we have an analytical description of the distribution function of the radial power density.</a:t>
-            </a:r>
-          </a:p>
-        </p:txBody>
-      </p:sp>
-      <p:pic>
-        <p:nvPicPr>
-          <p:cNvPr id="5" name="Εικόνα 4" descr="Εικόνα που περιέχει κείμενο, στιγμιότυπο οθόνης, γραμμή, γράφημα&#10;&#10;Περιγραφή που δημιουργήθηκε αυτόματα">
-            <a:extLst>
-              <a:ext uri="{FF2B5EF4-FFF2-40B4-BE49-F238E27FC236}">
-                <a16:creationId xmlns:a16="http://schemas.microsoft.com/office/drawing/2014/main" id="{9E96F26A-CA8A-AC04-7E97-0824770A2DCD}"/>
-              </a:ext>
-            </a:extLst>
-          </p:cNvPr>
-          <p:cNvPicPr>
-            <a:picLocks noChangeAspect="1"/>
-          </p:cNvPicPr>
-          <p:nvPr/>
-        </p:nvPicPr>
-        <p:blipFill>
-          <a:blip r:embed="rId2">
-            <a:extLst>
-              <a:ext uri="{28A0092B-C50C-407E-A947-70E740481C1C}">
-                <a14:useLocalDpi xmlns:a14="http://schemas.microsoft.com/office/drawing/2010/main" val="0"/>
-              </a:ext>
-            </a:extLst>
-          </a:blip>
-          <a:stretch>
-            <a:fillRect/>
-          </a:stretch>
-        </p:blipFill>
-        <p:spPr>
-          <a:xfrm>
-            <a:off x="271968" y="3530236"/>
-            <a:ext cx="4330484" cy="3247863"/>
-          </a:xfrm>
-          <a:prstGeom prst="rect">
-            <a:avLst/>
-          </a:prstGeom>
-        </p:spPr>
-      </p:pic>
-      <p:sp>
-        <p:nvSpPr>
-          <p:cNvPr id="6" name="Βέλος: Δεξιό 5">
-            <a:extLst>
-              <a:ext uri="{FF2B5EF4-FFF2-40B4-BE49-F238E27FC236}">
-                <a16:creationId xmlns:a16="http://schemas.microsoft.com/office/drawing/2014/main" id="{2221613E-7362-DDC6-F6F5-90C4992B6A2D}"/>
-              </a:ext>
-            </a:extLst>
-          </p:cNvPr>
-          <p:cNvSpPr/>
-          <p:nvPr/>
-        </p:nvSpPr>
-        <p:spPr>
-          <a:xfrm>
-            <a:off x="5019499" y="4877330"/>
-            <a:ext cx="1107347" cy="276836"/>
-          </a:xfrm>
-          <a:prstGeom prst="rightArrow">
-            <a:avLst/>
-          </a:prstGeom>
-        </p:spPr>
-        <p:style>
-          <a:lnRef idx="2">
-            <a:schemeClr val="accent1">
-              <a:shade val="15000"/>
-            </a:schemeClr>
-          </a:lnRef>
-          <a:fillRef idx="1">
-            <a:schemeClr val="accent1"/>
-          </a:fillRef>
-          <a:effectRef idx="0">
-            <a:schemeClr val="accent1"/>
-          </a:effectRef>
-          <a:fontRef idx="minor">
-            <a:schemeClr val="lt1"/>
-          </a:fontRef>
-        </p:style>
-        <p:txBody>
-          <a:bodyPr rtlCol="0" anchor="ctr"/>
-          <a:lstStyle/>
-          <a:p>
-            <a:pPr algn="ctr"/>
-            <a:endParaRPr lang="en-US"/>
-          </a:p>
-        </p:txBody>
-      </p:sp>
-      <p:pic>
-        <p:nvPicPr>
-          <p:cNvPr id="10" name="Εικόνα 9">
-            <a:extLst>
-              <a:ext uri="{FF2B5EF4-FFF2-40B4-BE49-F238E27FC236}">
-                <a16:creationId xmlns:a16="http://schemas.microsoft.com/office/drawing/2014/main" id="{577B24E5-DCAF-E86A-3E9B-972C44C74DAC}"/>
-              </a:ext>
-            </a:extLst>
-          </p:cNvPr>
-          <p:cNvPicPr>
-            <a:picLocks noChangeAspect="1"/>
-          </p:cNvPicPr>
-          <p:nvPr/>
-        </p:nvPicPr>
-        <p:blipFill>
-          <a:blip r:embed="rId3"/>
-          <a:stretch>
-            <a:fillRect/>
-          </a:stretch>
-        </p:blipFill>
-        <p:spPr>
-          <a:xfrm>
-            <a:off x="7493215" y="3690665"/>
-            <a:ext cx="3847663" cy="2927003"/>
-          </a:xfrm>
-          <a:prstGeom prst="rect">
-            <a:avLst/>
-          </a:prstGeom>
-        </p:spPr>
-      </p:pic>
-      <p:sp>
-        <p:nvSpPr>
-          <p:cNvPr id="11" name="TextBox 10">
-            <a:extLst>
-              <a:ext uri="{FF2B5EF4-FFF2-40B4-BE49-F238E27FC236}">
-                <a16:creationId xmlns:a16="http://schemas.microsoft.com/office/drawing/2014/main" id="{4C6C46B4-6530-4440-1ECF-84787AD3B33C}"/>
-              </a:ext>
-            </a:extLst>
-          </p:cNvPr>
-          <p:cNvSpPr txBox="1"/>
-          <p:nvPr/>
-        </p:nvSpPr>
-        <p:spPr>
-          <a:xfrm>
-            <a:off x="377505" y="3048912"/>
-            <a:ext cx="10690106" cy="369332"/>
-          </a:xfrm>
-          <a:prstGeom prst="rect">
-            <a:avLst/>
-          </a:prstGeom>
-          <a:noFill/>
-        </p:spPr>
-        <p:txBody>
-          <a:bodyPr wrap="none" rtlCol="0">
-            <a:spAutoFit/>
-          </a:bodyPr>
-          <a:lstStyle/>
-          <a:p>
-            <a:r>
-              <a:rPr lang="en-US" dirty="0"/>
-              <a:t>Problem statement: </a:t>
-            </a:r>
-            <a:r>
-              <a:rPr lang="en-US" dirty="0">
-                <a:highlight>
-                  <a:srgbClr val="00FF00"/>
-                </a:highlight>
-              </a:rPr>
-              <a:t>position of cuts is what</a:t>
-            </a:r>
-            <a:r>
-              <a:rPr lang="en-US" dirty="0"/>
-              <a:t>? </a:t>
-            </a:r>
-            <a:r>
-              <a:rPr lang="en-US" dirty="0">
-                <a:highlight>
-                  <a:srgbClr val="00FFFF"/>
-                </a:highlight>
-              </a:rPr>
-              <a:t>So that core averaged outlet T is maximized </a:t>
-            </a:r>
-            <a:r>
-              <a:rPr lang="en-US" dirty="0"/>
-              <a:t>while </a:t>
-            </a:r>
-            <a:r>
-              <a:rPr lang="en-US" dirty="0">
-                <a:highlight>
-                  <a:srgbClr val="FF00FF"/>
-                </a:highlight>
-              </a:rPr>
-              <a:t>fuel T below limits</a:t>
-            </a:r>
-          </a:p>
-        </p:txBody>
-      </p:sp>
-      <p:sp>
-        <p:nvSpPr>
-          <p:cNvPr id="12" name="TextBox 11">
-            <a:extLst>
-              <a:ext uri="{FF2B5EF4-FFF2-40B4-BE49-F238E27FC236}">
-                <a16:creationId xmlns:a16="http://schemas.microsoft.com/office/drawing/2014/main" id="{D32C6945-BF17-E480-4DA3-02E83B38149D}"/>
-              </a:ext>
-            </a:extLst>
-          </p:cNvPr>
-          <p:cNvSpPr txBox="1"/>
-          <p:nvPr/>
-        </p:nvSpPr>
-        <p:spPr>
-          <a:xfrm>
-            <a:off x="9546454" y="3276983"/>
-            <a:ext cx="1300294" cy="369332"/>
-          </a:xfrm>
-          <a:prstGeom prst="rect">
-            <a:avLst/>
-          </a:prstGeom>
-          <a:noFill/>
-        </p:spPr>
-        <p:txBody>
-          <a:bodyPr wrap="square" rtlCol="0">
-            <a:spAutoFit/>
-          </a:bodyPr>
-          <a:lstStyle/>
-          <a:p>
-            <a:r>
-              <a:rPr lang="en-US" b="1" dirty="0"/>
-              <a:t>constraints</a:t>
-            </a:r>
-          </a:p>
-        </p:txBody>
-      </p:sp>
-      <p:sp>
-        <p:nvSpPr>
-          <p:cNvPr id="13" name="TextBox 12">
-            <a:extLst>
-              <a:ext uri="{FF2B5EF4-FFF2-40B4-BE49-F238E27FC236}">
-                <a16:creationId xmlns:a16="http://schemas.microsoft.com/office/drawing/2014/main" id="{E3175FD6-820B-9DF9-968C-E01336BC1F94}"/>
-              </a:ext>
-            </a:extLst>
-          </p:cNvPr>
-          <p:cNvSpPr txBox="1"/>
-          <p:nvPr/>
-        </p:nvSpPr>
-        <p:spPr>
-          <a:xfrm>
-            <a:off x="5168684" y="3321333"/>
-            <a:ext cx="2716967" cy="369332"/>
-          </a:xfrm>
-          <a:prstGeom prst="rect">
-            <a:avLst/>
-          </a:prstGeom>
-          <a:noFill/>
-        </p:spPr>
-        <p:txBody>
-          <a:bodyPr wrap="square" rtlCol="0">
-            <a:spAutoFit/>
-          </a:bodyPr>
-          <a:lstStyle/>
-          <a:p>
-            <a:r>
-              <a:rPr lang="en-US" b="1" dirty="0"/>
-              <a:t>Optimization parameters</a:t>
-            </a:r>
-          </a:p>
-        </p:txBody>
-      </p:sp>
-      <p:sp>
-        <p:nvSpPr>
-          <p:cNvPr id="14" name="TextBox 13">
-            <a:extLst>
-              <a:ext uri="{FF2B5EF4-FFF2-40B4-BE49-F238E27FC236}">
-                <a16:creationId xmlns:a16="http://schemas.microsoft.com/office/drawing/2014/main" id="{80D06D70-CF31-DC4E-AD52-A4F913A6B6D2}"/>
-              </a:ext>
-            </a:extLst>
-          </p:cNvPr>
-          <p:cNvSpPr txBox="1"/>
-          <p:nvPr/>
-        </p:nvSpPr>
-        <p:spPr>
-          <a:xfrm>
-            <a:off x="2792759" y="3329854"/>
-            <a:ext cx="1345478" cy="369332"/>
-          </a:xfrm>
-          <a:prstGeom prst="rect">
-            <a:avLst/>
-          </a:prstGeom>
-          <a:noFill/>
-        </p:spPr>
-        <p:txBody>
-          <a:bodyPr wrap="square" rtlCol="0">
-            <a:spAutoFit/>
-          </a:bodyPr>
-          <a:lstStyle/>
-          <a:p>
-            <a:r>
-              <a:rPr lang="en-US" b="1" dirty="0" err="1"/>
-              <a:t>FoM</a:t>
-            </a:r>
-            <a:endParaRPr lang="en-US" b="1" dirty="0"/>
-          </a:p>
-        </p:txBody>
-      </p:sp>
-    </p:spTree>
-    <p:extLst>
-      <p:ext uri="{BB962C8B-B14F-4D97-AF65-F5344CB8AC3E}">
-        <p14:creationId xmlns:p14="http://schemas.microsoft.com/office/powerpoint/2010/main" val="2505318595"/>
-      </p:ext>
-    </p:extLst>
-  </p:cSld>
-  <p:clrMapOvr>
-    <a:masterClrMapping/>
-  </p:clrMapOvr>
-</p:sld>
-</file>
-
-<file path=ppt/slides/slide8.xml><?xml version="1.0" encoding="utf-8"?>
-<p:sld xmlns:a="http://schemas.openxmlformats.org/drawingml/2006/main" xmlns:r="http://schemas.openxmlformats.org/officeDocument/2006/relationships" xmlns:p="http://schemas.openxmlformats.org/presentationml/2006/main">
-  <p:cSld>
-    <p:spTree>
-      <p:nvGrpSpPr>
-        <p:cNvPr id="1" name=""/>
-        <p:cNvGrpSpPr/>
-        <p:nvPr/>
-      </p:nvGrpSpPr>
-      <p:grpSpPr>
-        <a:xfrm>
-          <a:off x="0" y="0"/>
-          <a:ext cx="0" cy="0"/>
-          <a:chOff x="0" y="0"/>
-          <a:chExt cx="0" cy="0"/>
-        </a:xfrm>
-      </p:grpSpPr>
-      <p:sp>
-        <p:nvSpPr>
-          <p:cNvPr id="2" name="Τίτλος 1">
-            <a:extLst>
-              <a:ext uri="{FF2B5EF4-FFF2-40B4-BE49-F238E27FC236}">
                 <a16:creationId xmlns:a16="http://schemas.microsoft.com/office/drawing/2014/main" id="{F820C86D-5953-6AA9-2155-2D68E05B7AD6}"/>
               </a:ext>
             </a:extLst>
@@ -4788,7 +5403,7 @@
             </p:spPr>
             <p:txBody>
               <a:bodyPr>
-                <a:normAutofit fontScale="92500" lnSpcReduction="10000"/>
+                <a:normAutofit fontScale="85000" lnSpcReduction="20000"/>
               </a:bodyPr>
               <a:lstStyle/>
               <a:p>
@@ -4831,7 +5446,7 @@
                 </a:pPr>
                 <a:r>
                   <a:rPr lang="en-US" sz="1800" dirty="0"/>
-                  <a:t>Identify maximum temperature that fuel should not reach</a:t>
+                  <a:t>Identify maximum temperature that fuel should not reach: input from user</a:t>
                 </a:r>
               </a:p>
               <a:p>
@@ -5287,6 +5902,24 @@
                 </a:r>
               </a:p>
               <a:p>
+                <a:pPr marL="457200" indent="-457200">
+                  <a:buAutoNum type="arabicPeriod"/>
+                </a:pPr>
+                <a:r>
+                  <a:rPr lang="en-US" sz="1800" dirty="0"/>
+                  <a:t>Plot core outlet temperature as a function of number of flow zones</a:t>
+                </a:r>
+              </a:p>
+              <a:p>
+                <a:pPr marL="457200" indent="-457200">
+                  <a:buAutoNum type="arabicPeriod"/>
+                </a:pPr>
+                <a:r>
+                  <a:rPr lang="en-US" sz="1800" dirty="0"/>
+                  <a:t>Decide how many flow zones should be used. </a:t>
+                </a:r>
+              </a:p>
+              <a:p>
                 <a:endParaRPr lang="en-US" sz="1800" dirty="0"/>
               </a:p>
             </p:txBody>
@@ -5317,7 +5950,7 @@
               <a:blipFill>
                 <a:blip r:embed="rId2"/>
                 <a:stretch>
-                  <a:fillRect l="-290" t="-1721" r="-522"/>
+                  <a:fillRect l="-174" t="-1878"/>
                 </a:stretch>
               </a:blipFill>
             </p:spPr>
@@ -5349,7 +5982,7 @@
 </p:sld>
 </file>
 
-<file path=ppt/slides/slide9.xml><?xml version="1.0" encoding="utf-8"?>
+<file path=ppt/slides/slide8.xml><?xml version="1.0" encoding="utf-8"?>
 <p:sld xmlns:a="http://schemas.openxmlformats.org/drawingml/2006/main" xmlns:r="http://schemas.openxmlformats.org/officeDocument/2006/relationships" xmlns:p="http://schemas.openxmlformats.org/presentationml/2006/main">
   <p:cSld>
     <p:spTree>
@@ -5441,7 +6074,7 @@
             </a:pPr>
             <a:r>
               <a:rPr lang="en-US" dirty="0"/>
-              <a:t>Distribution function for each snap-shot</a:t>
+              <a:t>Distribution function for each snap-shot (previous algorithm)</a:t>
             </a:r>
           </a:p>
           <a:p>
@@ -5458,8 +6091,12 @@
               <a:buAutoNum type="arabicPeriod"/>
             </a:pPr>
             <a:r>
+              <a:rPr lang="en-US" dirty="0" err="1"/>
+              <a:t>FoM</a:t>
+            </a:r>
+            <a:r>
               <a:rPr lang="en-US" dirty="0"/>
-              <a:t>Average outlet temperature from all snap-shots</a:t>
+              <a:t>: Average outlet temperature from all snap-shots</a:t>
             </a:r>
           </a:p>
         </p:txBody>

</xml_diff>